<commit_message>
Slides from SDT1 F13
</commit_message>
<xml_diff>
--- a/Slides/Troubleshooting.pptx
+++ b/Slides/Troubleshooting.pptx
@@ -266,7 +266,7 @@
           <a:p>
             <a:fld id="{571CE8D6-8999-DA4F-B8D6-1BA6250E802C}" type="datetimeFigureOut">
               <a:rPr lang="en-US" smtClean="0"/>
-              <a:t>2/3/13</a:t>
+              <a:t>2/5/13</a:t>
             </a:fld>
             <a:endParaRPr lang="en-US"/>
           </a:p>
@@ -432,7 +432,7 @@
           <a:p>
             <a:fld id="{3AAB9720-D45D-7243-8A10-0E0E458F9FA5}" type="datetimeFigureOut">
               <a:rPr lang="en-US" smtClean="0"/>
-              <a:t>2/3/13</a:t>
+              <a:t>2/5/13</a:t>
             </a:fld>
             <a:endParaRPr lang="en-US"/>
           </a:p>
@@ -1878,7 +1878,7 @@
           <a:p>
             <a:fld id="{7FFF1AA8-A9AD-5142-8652-595CE366748A}" type="datetime1">
               <a:rPr lang="en-US" smtClean="0"/>
-              <a:t>2/3/13</a:t>
+              <a:t>2/5/13</a:t>
             </a:fld>
             <a:endParaRPr lang="en-US"/>
           </a:p>
@@ -2052,7 +2052,7 @@
           <a:p>
             <a:fld id="{B6EC74EE-64A7-1A48-80FD-C881E5525360}" type="datetime1">
               <a:rPr lang="en-US" smtClean="0"/>
-              <a:t>2/3/13</a:t>
+              <a:t>2/5/13</a:t>
             </a:fld>
             <a:endParaRPr lang="en-US"/>
           </a:p>
@@ -2236,7 +2236,7 @@
           <a:p>
             <a:fld id="{CD4A008A-95F5-1C47-B5CD-F68294B98B0A}" type="datetime1">
               <a:rPr lang="en-US" smtClean="0"/>
-              <a:t>2/3/13</a:t>
+              <a:t>2/5/13</a:t>
             </a:fld>
             <a:endParaRPr lang="en-US"/>
           </a:p>
@@ -2410,7 +2410,7 @@
           <a:p>
             <a:fld id="{8BA10C16-A33A-FD45-8A7C-C808D5C62863}" type="datetime1">
               <a:rPr lang="en-US" smtClean="0"/>
-              <a:t>2/3/13</a:t>
+              <a:t>2/5/13</a:t>
             </a:fld>
             <a:endParaRPr lang="en-US"/>
           </a:p>
@@ -2660,7 +2660,7 @@
           <a:p>
             <a:fld id="{D9089BE4-EC6A-D74C-A6CD-A3547C65E103}" type="datetime1">
               <a:rPr lang="en-US" smtClean="0"/>
-              <a:t>2/3/13</a:t>
+              <a:t>2/5/13</a:t>
             </a:fld>
             <a:endParaRPr lang="en-US"/>
           </a:p>
@@ -2952,7 +2952,7 @@
           <a:p>
             <a:fld id="{A553E6DC-763E-354C-8AB1-B20C725FE265}" type="datetime1">
               <a:rPr lang="en-US" smtClean="0"/>
-              <a:t>2/3/13</a:t>
+              <a:t>2/5/13</a:t>
             </a:fld>
             <a:endParaRPr lang="en-US"/>
           </a:p>
@@ -3378,7 +3378,7 @@
           <a:p>
             <a:fld id="{FA4AC3DB-976E-DB4A-9A4E-99DBB7B5B7D5}" type="datetime1">
               <a:rPr lang="en-US" smtClean="0"/>
-              <a:t>2/3/13</a:t>
+              <a:t>2/5/13</a:t>
             </a:fld>
             <a:endParaRPr lang="en-US"/>
           </a:p>
@@ -3500,7 +3500,7 @@
           <a:p>
             <a:fld id="{1829906F-D344-654A-ABE1-BBF14635309C}" type="datetime1">
               <a:rPr lang="en-US" smtClean="0"/>
-              <a:t>2/3/13</a:t>
+              <a:t>2/5/13</a:t>
             </a:fld>
             <a:endParaRPr lang="en-US"/>
           </a:p>
@@ -3599,7 +3599,7 @@
           <a:p>
             <a:fld id="{0E66F0A3-56D9-6E40-80A6-1290D12038C5}" type="datetime1">
               <a:rPr lang="en-US" smtClean="0"/>
-              <a:t>2/3/13</a:t>
+              <a:t>2/5/13</a:t>
             </a:fld>
             <a:endParaRPr lang="en-US"/>
           </a:p>
@@ -3880,7 +3880,7 @@
           <a:p>
             <a:fld id="{96808922-CE1B-9444-BD58-CB676C7B233A}" type="datetime1">
               <a:rPr lang="en-US" smtClean="0"/>
-              <a:t>2/3/13</a:t>
+              <a:t>2/5/13</a:t>
             </a:fld>
             <a:endParaRPr lang="en-US"/>
           </a:p>
@@ -4137,7 +4137,7 @@
           <a:p>
             <a:fld id="{5E1132CB-2D38-7447-AE66-0AB8218E4A1B}" type="datetime1">
               <a:rPr lang="en-US" smtClean="0"/>
-              <a:t>2/3/13</a:t>
+              <a:t>2/5/13</a:t>
             </a:fld>
             <a:endParaRPr lang="en-US"/>
           </a:p>
@@ -4354,7 +4354,7 @@
           <a:p>
             <a:fld id="{9924D09A-7696-3945-BA7B-F29BDCFAD5CB}" type="datetime1">
               <a:rPr lang="en-US" smtClean="0"/>
-              <a:t>2/3/13</a:t>
+              <a:t>2/5/13</a:t>
             </a:fld>
             <a:endParaRPr lang="en-US"/>
           </a:p>
@@ -4923,7 +4923,7 @@
         </p:nvSpPr>
         <p:spPr>
           <a:xfrm>
-            <a:off x="5828690" y="5189482"/>
+            <a:off x="5275333" y="5032911"/>
             <a:ext cx="3603821" cy="1323439"/>
           </a:xfrm>
           <a:prstGeom prst="rect">
@@ -5552,11 +5552,7 @@
             </a:pPr>
             <a:r>
               <a:rPr lang="en-US" dirty="0" smtClean="0"/>
-              <a:t>Throughput / Response </a:t>
-            </a:r>
-            <a:r>
-              <a:rPr lang="en-US" dirty="0" smtClean="0"/>
-              <a:t>Time</a:t>
+              <a:t>Throughput / Response Time</a:t>
             </a:r>
           </a:p>
           <a:p>
@@ -5620,7 +5616,6 @@
               <a:rPr lang="en-US" dirty="0" smtClean="0"/>
               <a:t>OS performance indicators</a:t>
             </a:r>
-            <a:endParaRPr lang="en-US" dirty="0" smtClean="0"/>
           </a:p>
           <a:p>
             <a:pPr marL="517525" indent="-514350">
@@ -5871,13 +5866,8 @@
             <a:pPr algn="ctr"/>
             <a:r>
               <a:rPr lang="en-US" dirty="0" smtClean="0"/>
-              <a:t>Exercise </a:t>
-            </a:r>
-            <a:r>
-              <a:rPr lang="en-US" dirty="0" smtClean="0"/>
-              <a:t>2.2:</a:t>
-            </a:r>
-            <a:endParaRPr lang="en-US" dirty="0" smtClean="0"/>
+              <a:t>Exercise 2.2:</a:t>
+            </a:r>
           </a:p>
           <a:p>
             <a:pPr algn="ctr"/>
@@ -5925,13 +5915,8 @@
             <a:pPr algn="ctr"/>
             <a:r>
               <a:rPr lang="en-US" dirty="0" smtClean="0"/>
-              <a:t>Exercise </a:t>
-            </a:r>
-            <a:r>
-              <a:rPr lang="en-US" dirty="0" smtClean="0"/>
-              <a:t>2.3:</a:t>
-            </a:r>
-            <a:endParaRPr lang="en-US" dirty="0" smtClean="0"/>
+              <a:t>Exercise 2.3:</a:t>
+            </a:r>
           </a:p>
           <a:p>
             <a:r>
@@ -6275,27 +6260,14 @@
             <a:pPr algn="ctr"/>
             <a:r>
               <a:rPr lang="en-US" dirty="0" smtClean="0"/>
-              <a:t>Exercise </a:t>
-            </a:r>
-            <a:r>
-              <a:rPr lang="en-US" dirty="0" smtClean="0"/>
-              <a:t>2.4:</a:t>
-            </a:r>
-            <a:endParaRPr lang="en-US" dirty="0" smtClean="0"/>
+              <a:t>Exercise 2.4:</a:t>
+            </a:r>
           </a:p>
           <a:p>
             <a:pPr algn="ctr"/>
             <a:r>
               <a:rPr lang="en-US" sz="1400" dirty="0" smtClean="0"/>
-              <a:t>What </a:t>
-            </a:r>
-            <a:r>
-              <a:rPr lang="en-US" sz="1400" dirty="0" smtClean="0"/>
-              <a:t>are</a:t>
-            </a:r>
-            <a:r>
-              <a:rPr lang="en-US" sz="1400" dirty="0" smtClean="0"/>
-              <a:t> system-wide indicators good for? </a:t>
+              <a:t>What are system-wide indicators good for? </a:t>
             </a:r>
             <a:endParaRPr lang="en-US" sz="1400" dirty="0"/>
           </a:p>
@@ -8049,13 +8021,8 @@
             <a:pPr algn="ctr"/>
             <a:r>
               <a:rPr lang="en-US" dirty="0" smtClean="0"/>
-              <a:t>Exercise </a:t>
-            </a:r>
-            <a:r>
-              <a:rPr lang="en-US" dirty="0" smtClean="0"/>
-              <a:t>2.7:</a:t>
-            </a:r>
-            <a:endParaRPr lang="en-US" dirty="0" smtClean="0"/>
+              <a:t>Exercise 2.7:</a:t>
+            </a:r>
           </a:p>
           <a:p>
             <a:r>
@@ -8102,13 +8069,8 @@
             <a:pPr algn="ctr"/>
             <a:r>
               <a:rPr lang="en-US" dirty="0" smtClean="0"/>
-              <a:t>Exercise </a:t>
-            </a:r>
-            <a:r>
-              <a:rPr lang="en-US" dirty="0" smtClean="0"/>
-              <a:t>2.6:</a:t>
-            </a:r>
-            <a:endParaRPr lang="en-US" dirty="0" smtClean="0"/>
+              <a:t>Exercise 2.6:</a:t>
+            </a:r>
           </a:p>
           <a:p>
             <a:r>
@@ -8635,13 +8597,8 @@
             <a:pPr algn="ctr"/>
             <a:r>
               <a:rPr lang="en-US" dirty="0" smtClean="0"/>
-              <a:t>Exercise </a:t>
-            </a:r>
-            <a:r>
-              <a:rPr lang="en-US" dirty="0" smtClean="0"/>
-              <a:t>2.5:</a:t>
-            </a:r>
-            <a:endParaRPr lang="en-US" dirty="0" smtClean="0"/>
+              <a:t>Exercise 2.5:</a:t>
+            </a:r>
           </a:p>
           <a:p>
             <a:r>
@@ -14129,7 +14086,6 @@
               <a:rPr lang="en-US" sz="1600" dirty="0"/>
               <a:t>What timestamps indicators are available?</a:t>
             </a:r>
-            <a:endParaRPr lang="en-US" sz="1600" dirty="0"/>
           </a:p>
         </p:txBody>
       </p:sp>
@@ -14245,11 +14201,7 @@
             <a:pPr lvl="1"/>
             <a:r>
               <a:rPr lang="en-US" dirty="0" smtClean="0"/>
-              <a:t>More </a:t>
-            </a:r>
-            <a:r>
-              <a:rPr lang="en-US" dirty="0" smtClean="0"/>
-              <a:t>details as we progress through lectures</a:t>
+              <a:t>More details as we progress through lectures</a:t>
             </a:r>
           </a:p>
           <a:p>
@@ -14314,6 +14266,13 @@
   <p:clrMapOvr>
     <a:masterClrMapping/>
   </p:clrMapOvr>
+  <p:timing>
+    <p:tnLst>
+      <p:par>
+        <p:cTn xmlns:p14="http://schemas.microsoft.com/office/powerpoint/2010/main" id="1" dur="indefinite" restart="never" nodeType="tmRoot"/>
+      </p:par>
+    </p:tnLst>
+  </p:timing>
 </p:sld>
 </file>
 
@@ -14461,11 +14420,7 @@
           <a:p>
             <a:r>
               <a:rPr lang="en-US" dirty="0" smtClean="0"/>
-              <a:t>Application </a:t>
-            </a:r>
-            <a:r>
-              <a:rPr lang="en-US" dirty="0" smtClean="0"/>
-              <a:t>handle</a:t>
+              <a:t>Application handle</a:t>
             </a:r>
           </a:p>
           <a:p>
@@ -14473,7 +14428,6 @@
               <a:rPr lang="en-US" dirty="0" smtClean="0"/>
               <a:t>Workload</a:t>
             </a:r>
-            <a:endParaRPr lang="en-US" dirty="0" smtClean="0"/>
           </a:p>
           <a:p>
             <a:r>
@@ -14535,11 +14489,7 @@
             </a:r>
             <a:r>
               <a:rPr lang="en-US" dirty="0" smtClean="0"/>
-              <a:t>: </a:t>
-            </a:r>
-            <a:r>
-              <a:rPr lang="en-US" dirty="0" smtClean="0"/>
-              <a:t>DB2 10.1 </a:t>
+              <a:t>: DB2 10.1 </a:t>
             </a:r>
             <a:r>
               <a:rPr lang="en-US" dirty="0" smtClean="0">
@@ -14667,26 +14617,13 @@
             <a:pPr algn="ctr"/>
             <a:r>
               <a:rPr lang="en-US" sz="2400" dirty="0" smtClean="0"/>
-              <a:t>Exercise </a:t>
-            </a:r>
-            <a:r>
-              <a:rPr lang="en-US" sz="2400" dirty="0" smtClean="0"/>
-              <a:t>2.8:</a:t>
-            </a:r>
-            <a:endParaRPr lang="en-US" sz="2400" dirty="0" smtClean="0"/>
+              <a:t>Exercise 2.8:</a:t>
+            </a:r>
           </a:p>
           <a:p>
             <a:r>
               <a:rPr lang="en-US" dirty="0" smtClean="0"/>
-              <a:t>Assume your DBMS is DB2 </a:t>
-            </a:r>
-            <a:r>
-              <a:rPr lang="en-US" dirty="0" smtClean="0"/>
-              <a:t>10.1 express C. </a:t>
-            </a:r>
-            <a:r>
-              <a:rPr lang="en-US" dirty="0" smtClean="0"/>
-              <a:t>How can you answer the following questions:</a:t>
+              <a:t>Assume your DBMS is DB2 10.1 express C. How can you answer the following questions:</a:t>
             </a:r>
           </a:p>
           <a:p>
@@ -14696,19 +14633,7 @@
             </a:pPr>
             <a:r>
               <a:rPr lang="en-US" dirty="0" smtClean="0"/>
-              <a:t>How many IOs are performed </a:t>
-            </a:r>
-            <a:r>
-              <a:rPr lang="en-US" dirty="0" smtClean="0"/>
-              <a:t>from the command line for the execution of a </a:t>
-            </a:r>
-            <a:r>
-              <a:rPr lang="en-US" dirty="0" smtClean="0"/>
-              <a:t>given </a:t>
-            </a:r>
-            <a:r>
-              <a:rPr lang="en-US" dirty="0" smtClean="0"/>
-              <a:t>query?</a:t>
+              <a:t>How many IOs are performed from the command line for the execution of a given query?</a:t>
             </a:r>
           </a:p>
           <a:p>
@@ -14720,7 +14645,6 @@
               <a:rPr lang="en-US" dirty="0" smtClean="0"/>
               <a:t>How many pages are actually read? How much space is used in the buffer pool?</a:t>
             </a:r>
-            <a:endParaRPr lang="en-US" dirty="0" smtClean="0"/>
           </a:p>
           <a:p>
             <a:pPr marL="285750" indent="-285750">
@@ -14749,11 +14673,7 @@
             </a:pPr>
             <a:r>
               <a:rPr lang="en-US" dirty="0" smtClean="0"/>
-              <a:t>What portion of those IOs are sequential</a:t>
-            </a:r>
-            <a:r>
-              <a:rPr lang="en-US" dirty="0" smtClean="0"/>
-              <a:t>?</a:t>
+              <a:t>What portion of those IOs are sequential?</a:t>
             </a:r>
             <a:endParaRPr lang="en-US" dirty="0"/>
           </a:p>
@@ -14766,7 +14686,6 @@
               <a:rPr lang="en-US" dirty="0" smtClean="0"/>
               <a:t>How much overhead is there in obtaining the answer to those questions?</a:t>
             </a:r>
-            <a:endParaRPr lang="en-US" dirty="0" smtClean="0"/>
           </a:p>
         </p:txBody>
       </p:sp>
@@ -14898,19 +14817,11 @@
             <a:pPr algn="ctr"/>
             <a:r>
               <a:rPr lang="en-US" sz="2400" dirty="0" smtClean="0"/>
-              <a:t>Exercise </a:t>
-            </a:r>
-            <a:r>
-              <a:rPr lang="en-US" sz="2400" dirty="0" smtClean="0"/>
-              <a:t>2.8: </a:t>
+              <a:t>Exercise 2.8: </a:t>
             </a:r>
             <a:r>
               <a:rPr lang="en-US" sz="2400" dirty="0" err="1" smtClean="0"/>
-              <a:t>mon</a:t>
-            </a:r>
-            <a:r>
-              <a:rPr lang="en-US" sz="2400" dirty="0" err="1" smtClean="0"/>
-              <a:t>_IO.sql</a:t>
+              <a:t>mon_IO.sql</a:t>
             </a:r>
             <a:endParaRPr lang="en-US" sz="2400" dirty="0" smtClean="0"/>
           </a:p>
@@ -14958,8 +14869,12 @@
               <a:t>	(</a:t>
             </a:r>
             <a:r>
+              <a:rPr lang="en-US" sz="1100" dirty="0" smtClean="0"/>
+              <a:t>B.POOL_DATA_L_READS </a:t>
+            </a:r>
+            <a:r>
               <a:rPr lang="en-US" sz="1100" dirty="0"/>
-              <a:t>B.POOL_TEMP_DATA_L_READS + B.POOL_INDEX_L_READS + </a:t>
+              <a:t>+ B.POOL_INDEX_L_READS + </a:t>
             </a:r>
           </a:p>
           <a:p>
@@ -14983,7 +14898,19 @@
             </a:r>
             <a:r>
               <a:rPr lang="en-US" sz="1100" dirty="0"/>
-              <a:t>	(B.POOL_DATA_P_READS + B.POOL_DATA_P_READS + </a:t>
+              <a:t>	(B.POOL_DATA_P_READS </a:t>
+            </a:r>
+            <a:r>
+              <a:rPr lang="en-US" sz="1100"/>
+              <a:t>+ </a:t>
+            </a:r>
+            <a:r>
+              <a:rPr lang="en-US" sz="1100" smtClean="0"/>
+              <a:t>B.POOL_INDEX_P_READS </a:t>
+            </a:r>
+            <a:r>
+              <a:rPr lang="en-US" sz="1100" dirty="0"/>
+              <a:t>+ </a:t>
             </a:r>
           </a:p>
           <a:p>
@@ -15286,11 +15213,7 @@
             <a:pPr algn="ctr"/>
             <a:r>
               <a:rPr lang="en-US" sz="2400" dirty="0" smtClean="0"/>
-              <a:t>Exercise </a:t>
-            </a:r>
-            <a:r>
-              <a:rPr lang="en-US" sz="2400" dirty="0" smtClean="0"/>
-              <a:t>2.8:</a:t>
+              <a:t>Exercise 2.8:</a:t>
             </a:r>
           </a:p>
           <a:p>
@@ -15307,7 +15230,6 @@
               <a:rPr lang="en-US" sz="2400" dirty="0" smtClean="0"/>
               <a:t> exercise, then the aircraft table has been populated inside the tuning database on the db2inst1 instance</a:t>
             </a:r>
-            <a:endParaRPr lang="en-US" sz="2400" dirty="0" smtClean="0"/>
           </a:p>
           <a:p>
             <a:pPr algn="ctr"/>
@@ -15328,17 +15250,7 @@
                   </a:schemeClr>
                 </a:solidFill>
               </a:rPr>
-              <a:t>db2inst1@student-VirtualBox:</a:t>
-            </a:r>
-            <a:r>
-              <a:rPr lang="en-US" sz="1100" dirty="0" smtClean="0">
-                <a:solidFill>
-                  <a:schemeClr val="bg1">
-                    <a:lumMod val="65000"/>
-                  </a:schemeClr>
-                </a:solidFill>
-              </a:rPr>
-              <a:t>~$ </a:t>
+              <a:t>db2inst1@student-VirtualBox:~$ </a:t>
             </a:r>
             <a:r>
               <a:rPr lang="en-US" sz="1100" dirty="0" smtClean="0"/>
@@ -23077,11 +22989,7 @@
             <a:pPr algn="ctr"/>
             <a:r>
               <a:rPr lang="en-US" sz="1400" dirty="0" smtClean="0"/>
-              <a:t>Is intra-query parallelism possible with this process model? In other words, c</a:t>
-            </a:r>
-            <a:r>
-              <a:rPr lang="en-US" sz="1400" dirty="0" smtClean="0"/>
-              <a:t>an a query be executed in</a:t>
+              <a:t>Is intra-query parallelism possible with this process model? In other words, can a query be executed in</a:t>
             </a:r>
             <a:br>
               <a:rPr lang="en-US" sz="1400" dirty="0" smtClean="0"/>

</xml_diff>